<commit_message>
Add Project Tycho reference to poster
</commit_message>
<xml_diff>
--- a/measles_poster.pptx
+++ b/measles_poster.pptx
@@ -2196,7 +2196,7 @@
           </a:ln>
           <a:extLst>
             <a:ext uri="{C572A759-6A51-4108-AA02-DFA0A04FC94B}">
-              <ma14:wrappingTextBoxFlag xmlns:ma14="http://schemas.microsoft.com/office/mac/drawingml/2011/main" xmlns:a14="http://schemas.microsoft.com/office/drawing/2010/main" xmlns:m="http://schemas.openxmlformats.org/officeDocument/2006/math" xmlns="" val="1"/>
+              <ma14:wrappingTextBoxFlag xmlns="" xmlns:m="http://schemas.openxmlformats.org/officeDocument/2006/math" xmlns:a14="http://schemas.microsoft.com/office/drawing/2010/main" xmlns:ma14="http://schemas.microsoft.com/office/mac/drawingml/2011/main" val="1"/>
             </a:ext>
           </a:extLst>
         </p:spPr>
@@ -2235,7 +2235,7 @@
           </a:ln>
           <a:extLst>
             <a:ext uri="{C572A759-6A51-4108-AA02-DFA0A04FC94B}">
-              <ma14:wrappingTextBoxFlag xmlns:ma14="http://schemas.microsoft.com/office/mac/drawingml/2011/main" xmlns:a14="http://schemas.microsoft.com/office/drawing/2010/main" xmlns:m="http://schemas.openxmlformats.org/officeDocument/2006/math" xmlns="" val="1"/>
+              <ma14:wrappingTextBoxFlag xmlns="" xmlns:m="http://schemas.openxmlformats.org/officeDocument/2006/math" xmlns:a14="http://schemas.microsoft.com/office/drawing/2010/main" xmlns:ma14="http://schemas.microsoft.com/office/mac/drawingml/2011/main" val="1"/>
             </a:ext>
           </a:extLst>
         </p:spPr>
@@ -3206,7 +3206,7 @@
           </a:ln>
           <a:extLst>
             <a:ext uri="{C572A759-6A51-4108-AA02-DFA0A04FC94B}">
-              <ma14:wrappingTextBoxFlag xmlns:ma14="http://schemas.microsoft.com/office/mac/drawingml/2011/main" xmlns:a14="http://schemas.microsoft.com/office/drawing/2010/main" xmlns:m="http://schemas.openxmlformats.org/officeDocument/2006/math" xmlns="" val="1"/>
+              <ma14:wrappingTextBoxFlag xmlns="" xmlns:m="http://schemas.openxmlformats.org/officeDocument/2006/math" xmlns:a14="http://schemas.microsoft.com/office/drawing/2010/main" xmlns:ma14="http://schemas.microsoft.com/office/mac/drawingml/2011/main" val="1"/>
             </a:ext>
           </a:extLst>
         </p:spPr>
@@ -3545,7 +3545,7 @@
           </a:ln>
           <a:extLst>
             <a:ext uri="{C572A759-6A51-4108-AA02-DFA0A04FC94B}">
-              <ma14:wrappingTextBoxFlag xmlns:ma14="http://schemas.microsoft.com/office/mac/drawingml/2011/main" xmlns:a14="http://schemas.microsoft.com/office/drawing/2010/main" xmlns:m="http://schemas.openxmlformats.org/officeDocument/2006/math" xmlns="" val="1"/>
+              <ma14:wrappingTextBoxFlag xmlns="" xmlns:m="http://schemas.openxmlformats.org/officeDocument/2006/math" xmlns:a14="http://schemas.microsoft.com/office/drawing/2010/main" xmlns:ma14="http://schemas.microsoft.com/office/mac/drawingml/2011/main" val="1"/>
             </a:ext>
           </a:extLst>
         </p:spPr>
@@ -3601,7 +3601,7 @@
           </a:ln>
           <a:extLst>
             <a:ext uri="{C572A759-6A51-4108-AA02-DFA0A04FC94B}">
-              <ma14:wrappingTextBoxFlag xmlns:ma14="http://schemas.microsoft.com/office/mac/drawingml/2011/main" xmlns:a14="http://schemas.microsoft.com/office/drawing/2010/main" xmlns:m="http://schemas.openxmlformats.org/officeDocument/2006/math" xmlns="" val="1"/>
+              <ma14:wrappingTextBoxFlag xmlns="" xmlns:m="http://schemas.openxmlformats.org/officeDocument/2006/math" xmlns:a14="http://schemas.microsoft.com/office/drawing/2010/main" xmlns:ma14="http://schemas.microsoft.com/office/mac/drawingml/2011/main" val="1"/>
             </a:ext>
           </a:extLst>
         </p:spPr>
@@ -4338,7 +4338,7 @@
           </a:ln>
           <a:extLst>
             <a:ext uri="{C572A759-6A51-4108-AA02-DFA0A04FC94B}">
-              <ma14:wrappingTextBoxFlag xmlns:ma14="http://schemas.microsoft.com/office/mac/drawingml/2011/main" xmlns:a14="http://schemas.microsoft.com/office/drawing/2010/main" xmlns:m="http://schemas.openxmlformats.org/officeDocument/2006/math" xmlns="" val="1"/>
+              <ma14:wrappingTextBoxFlag xmlns="" xmlns:m="http://schemas.openxmlformats.org/officeDocument/2006/math" xmlns:a14="http://schemas.microsoft.com/office/drawing/2010/main" xmlns:ma14="http://schemas.microsoft.com/office/mac/drawingml/2011/main" val="1"/>
             </a:ext>
           </a:extLst>
         </p:spPr>
@@ -4441,7 +4441,7 @@
           </a:ln>
           <a:extLst>
             <a:ext uri="{C572A759-6A51-4108-AA02-DFA0A04FC94B}">
-              <ma14:wrappingTextBoxFlag xmlns:ma14="http://schemas.microsoft.com/office/mac/drawingml/2011/main" xmlns:a14="http://schemas.microsoft.com/office/drawing/2010/main" xmlns:m="http://schemas.openxmlformats.org/officeDocument/2006/math" xmlns="" val="1"/>
+              <ma14:wrappingTextBoxFlag xmlns="" xmlns:m="http://schemas.openxmlformats.org/officeDocument/2006/math" xmlns:a14="http://schemas.microsoft.com/office/drawing/2010/main" xmlns:ma14="http://schemas.microsoft.com/office/mac/drawingml/2011/main" val="1"/>
             </a:ext>
           </a:extLst>
         </p:spPr>
@@ -4503,7 +4503,7 @@
           </a:ln>
           <a:extLst>
             <a:ext uri="{C572A759-6A51-4108-AA02-DFA0A04FC94B}">
-              <ma14:wrappingTextBoxFlag xmlns:ma14="http://schemas.microsoft.com/office/mac/drawingml/2011/main" xmlns:a14="http://schemas.microsoft.com/office/drawing/2010/main" xmlns:m="http://schemas.openxmlformats.org/officeDocument/2006/math" xmlns="" val="1"/>
+              <ma14:wrappingTextBoxFlag xmlns="" xmlns:m="http://schemas.openxmlformats.org/officeDocument/2006/math" xmlns:a14="http://schemas.microsoft.com/office/drawing/2010/main" xmlns:ma14="http://schemas.microsoft.com/office/mac/drawingml/2011/main" val="1"/>
             </a:ext>
           </a:extLst>
         </p:spPr>
@@ -4806,7 +4806,7 @@
           </a:ln>
           <a:extLst>
             <a:ext uri="{C572A759-6A51-4108-AA02-DFA0A04FC94B}">
-              <ma14:wrappingTextBoxFlag xmlns:ma14="http://schemas.microsoft.com/office/mac/drawingml/2011/main" xmlns:a14="http://schemas.microsoft.com/office/drawing/2010/main" xmlns:m="http://schemas.openxmlformats.org/officeDocument/2006/math" xmlns="" val="1"/>
+              <ma14:wrappingTextBoxFlag xmlns="" xmlns:m="http://schemas.openxmlformats.org/officeDocument/2006/math" xmlns:a14="http://schemas.microsoft.com/office/drawing/2010/main" xmlns:ma14="http://schemas.microsoft.com/office/mac/drawingml/2011/main" val="1"/>
             </a:ext>
           </a:extLst>
         </p:spPr>
@@ -4862,7 +4862,7 @@
           </a:ln>
           <a:extLst>
             <a:ext uri="{C572A759-6A51-4108-AA02-DFA0A04FC94B}">
-              <ma14:wrappingTextBoxFlag xmlns:ma14="http://schemas.microsoft.com/office/mac/drawingml/2011/main" xmlns:a14="http://schemas.microsoft.com/office/drawing/2010/main" xmlns:m="http://schemas.openxmlformats.org/officeDocument/2006/math" xmlns="" val="1"/>
+              <ma14:wrappingTextBoxFlag xmlns="" xmlns:m="http://schemas.openxmlformats.org/officeDocument/2006/math" xmlns:a14="http://schemas.microsoft.com/office/drawing/2010/main" xmlns:ma14="http://schemas.microsoft.com/office/mac/drawingml/2011/main" val="1"/>
             </a:ext>
           </a:extLst>
         </p:spPr>
@@ -4926,7 +4926,7 @@
           </a:ln>
           <a:extLst>
             <a:ext uri="{C572A759-6A51-4108-AA02-DFA0A04FC94B}">
-              <ma14:wrappingTextBoxFlag xmlns:ma14="http://schemas.microsoft.com/office/mac/drawingml/2011/main" xmlns:a14="http://schemas.microsoft.com/office/drawing/2010/main" xmlns:m="http://schemas.openxmlformats.org/officeDocument/2006/math" xmlns="" val="1"/>
+              <ma14:wrappingTextBoxFlag xmlns="" xmlns:m="http://schemas.openxmlformats.org/officeDocument/2006/math" xmlns:a14="http://schemas.microsoft.com/office/drawing/2010/main" xmlns:ma14="http://schemas.microsoft.com/office/mac/drawingml/2011/main" val="1"/>
             </a:ext>
           </a:extLst>
         </p:spPr>
@@ -5160,7 +5160,7 @@
           </a:ln>
           <a:extLst>
             <a:ext uri="{C572A759-6A51-4108-AA02-DFA0A04FC94B}">
-              <ma14:wrappingTextBoxFlag xmlns:ma14="http://schemas.microsoft.com/office/mac/drawingml/2011/main" xmlns:a14="http://schemas.microsoft.com/office/drawing/2010/main" xmlns:m="http://schemas.openxmlformats.org/officeDocument/2006/math" xmlns="" val="1"/>
+              <ma14:wrappingTextBoxFlag xmlns="" xmlns:m="http://schemas.openxmlformats.org/officeDocument/2006/math" xmlns:a14="http://schemas.microsoft.com/office/drawing/2010/main" xmlns:ma14="http://schemas.microsoft.com/office/mac/drawingml/2011/main" val="1"/>
             </a:ext>
           </a:extLst>
         </p:spPr>
@@ -5263,7 +5263,7 @@
           </a:ln>
           <a:extLst>
             <a:ext uri="{C572A759-6A51-4108-AA02-DFA0A04FC94B}">
-              <ma14:wrappingTextBoxFlag xmlns:ma14="http://schemas.microsoft.com/office/mac/drawingml/2011/main" xmlns:a14="http://schemas.microsoft.com/office/drawing/2010/main" xmlns:m="http://schemas.openxmlformats.org/officeDocument/2006/math" xmlns="" val="1"/>
+              <ma14:wrappingTextBoxFlag xmlns="" xmlns:m="http://schemas.openxmlformats.org/officeDocument/2006/math" xmlns:a14="http://schemas.microsoft.com/office/drawing/2010/main" xmlns:ma14="http://schemas.microsoft.com/office/mac/drawingml/2011/main" val="1"/>
             </a:ext>
           </a:extLst>
         </p:spPr>
@@ -5374,7 +5374,7 @@
           </a:ln>
           <a:extLst>
             <a:ext uri="{C572A759-6A51-4108-AA02-DFA0A04FC94B}">
-              <ma14:wrappingTextBoxFlag xmlns:ma14="http://schemas.microsoft.com/office/mac/drawingml/2011/main" xmlns:a14="http://schemas.microsoft.com/office/drawing/2010/main" xmlns:m="http://schemas.openxmlformats.org/officeDocument/2006/math" xmlns="" val="1"/>
+              <ma14:wrappingTextBoxFlag xmlns="" xmlns:m="http://schemas.openxmlformats.org/officeDocument/2006/math" xmlns:a14="http://schemas.microsoft.com/office/drawing/2010/main" xmlns:ma14="http://schemas.microsoft.com/office/mac/drawingml/2011/main" val="1"/>
             </a:ext>
           </a:extLst>
         </p:spPr>
@@ -5609,7 +5609,7 @@
           </a:ln>
           <a:extLst>
             <a:ext uri="{C572A759-6A51-4108-AA02-DFA0A04FC94B}">
-              <ma14:wrappingTextBoxFlag xmlns:ma14="http://schemas.microsoft.com/office/mac/drawingml/2011/main" xmlns:a14="http://schemas.microsoft.com/office/drawing/2010/main" xmlns:m="http://schemas.openxmlformats.org/officeDocument/2006/math" xmlns="" val="1"/>
+              <ma14:wrappingTextBoxFlag xmlns="" xmlns:m="http://schemas.openxmlformats.org/officeDocument/2006/math" xmlns:a14="http://schemas.microsoft.com/office/drawing/2010/main" xmlns:ma14="http://schemas.microsoft.com/office/mac/drawingml/2011/main" val="1"/>
             </a:ext>
           </a:extLst>
         </p:spPr>
@@ -5662,7 +5662,7 @@
         <p:spPr>
           <a:xfrm>
             <a:off x="3059825" y="1686635"/>
-            <a:ext cx="2508751" cy="1441976"/>
+            <a:ext cx="2508751" cy="1657419"/>
           </a:xfrm>
           <a:prstGeom prst="rect">
             <a:avLst/>
@@ -5672,7 +5672,7 @@
           </a:ln>
           <a:extLst>
             <a:ext uri="{C572A759-6A51-4108-AA02-DFA0A04FC94B}">
-              <ma14:wrappingTextBoxFlag xmlns:ma14="http://schemas.microsoft.com/office/mac/drawingml/2011/main" xmlns:a14="http://schemas.microsoft.com/office/drawing/2010/main" xmlns:m="http://schemas.openxmlformats.org/officeDocument/2006/math" xmlns="" val="1"/>
+              <ma14:wrappingTextBoxFlag xmlns="" xmlns:m="http://schemas.openxmlformats.org/officeDocument/2006/math" xmlns:a14="http://schemas.microsoft.com/office/drawing/2010/main" xmlns:ma14="http://schemas.microsoft.com/office/mac/drawingml/2011/main" val="1"/>
             </a:ext>
           </a:extLst>
         </p:spPr>
@@ -5713,7 +5713,29 @@
                 <a:latin typeface="Source Sans Pro" panose="020B0503030403020204" pitchFamily="34" charset="0"/>
                 <a:ea typeface="Source Sans Pro" panose="020B0503030403020204" pitchFamily="34" charset="0"/>
               </a:rPr>
-              <a:t>: Weekly counts of measles cases</a:t>
+              <a:t> (Van </a:t>
+            </a:r>
+            <a:r>
+              <a:rPr lang="en-SG" sz="1400" b="0" dirty="0" err="1">
+                <a:solidFill>
+                  <a:schemeClr val="tx1"/>
+                </a:solidFill>
+                <a:effectLst/>
+                <a:latin typeface="Source Sans Pro" panose="020B0503030403020204" pitchFamily="34" charset="0"/>
+                <a:ea typeface="Source Sans Pro" panose="020B0503030403020204" pitchFamily="34" charset="0"/>
+              </a:rPr>
+              <a:t>Panhuis</a:t>
+            </a:r>
+            <a:r>
+              <a:rPr lang="en-SG" sz="1400" b="0" dirty="0">
+                <a:solidFill>
+                  <a:schemeClr val="tx1"/>
+                </a:solidFill>
+                <a:effectLst/>
+                <a:latin typeface="Source Sans Pro" panose="020B0503030403020204" pitchFamily="34" charset="0"/>
+                <a:ea typeface="Source Sans Pro" panose="020B0503030403020204" pitchFamily="34" charset="0"/>
+              </a:rPr>
+              <a:t> et al., 2018): Weekly counts of measles cases</a:t>
             </a:r>
           </a:p>
           <a:p>
@@ -5801,7 +5823,7 @@
           </a:ln>
           <a:extLst>
             <a:ext uri="{C572A759-6A51-4108-AA02-DFA0A04FC94B}">
-              <ma14:wrappingTextBoxFlag xmlns:ma14="http://schemas.microsoft.com/office/mac/drawingml/2011/main" xmlns:a14="http://schemas.microsoft.com/office/drawing/2010/main" xmlns:m="http://schemas.openxmlformats.org/officeDocument/2006/math" xmlns="" val="1"/>
+              <ma14:wrappingTextBoxFlag xmlns="" xmlns:m="http://schemas.openxmlformats.org/officeDocument/2006/math" xmlns:a14="http://schemas.microsoft.com/office/drawing/2010/main" xmlns:ma14="http://schemas.microsoft.com/office/mac/drawingml/2011/main" val="1"/>
             </a:ext>
           </a:extLst>
         </p:spPr>
@@ -5980,7 +6002,7 @@
           </a:ln>
           <a:extLst>
             <a:ext uri="{C572A759-6A51-4108-AA02-DFA0A04FC94B}">
-              <ma14:wrappingTextBoxFlag xmlns:ma14="http://schemas.microsoft.com/office/mac/drawingml/2011/main" xmlns:a14="http://schemas.microsoft.com/office/drawing/2010/main" xmlns:m="http://schemas.openxmlformats.org/officeDocument/2006/math" xmlns="" val="1"/>
+              <ma14:wrappingTextBoxFlag xmlns="" xmlns:m="http://schemas.openxmlformats.org/officeDocument/2006/math" xmlns:a14="http://schemas.microsoft.com/office/drawing/2010/main" xmlns:ma14="http://schemas.microsoft.com/office/mac/drawingml/2011/main" val="1"/>
             </a:ext>
           </a:extLst>
         </p:spPr>

</xml_diff>

<commit_message>
Add references for R, STATS Indiana, Tidyverse
</commit_message>
<xml_diff>
--- a/measles_poster.pptx
+++ b/measles_poster.pptx
@@ -4165,8 +4165,8 @@
         </p:nvSpPr>
         <p:spPr>
           <a:xfrm>
-            <a:off x="5778494" y="1361114"/>
-            <a:ext cx="2484000" cy="0"/>
+            <a:off x="5454000" y="1362078"/>
+            <a:ext cx="2808000" cy="1779"/>
           </a:xfrm>
           <a:prstGeom prst="line">
             <a:avLst/>
@@ -4213,7 +4213,7 @@
         </p:nvSpPr>
         <p:spPr>
           <a:xfrm>
-            <a:off x="3076394" y="1364515"/>
+            <a:off x="2815124" y="1364515"/>
             <a:ext cx="2484000" cy="335488"/>
           </a:xfrm>
           <a:prstGeom prst="rect">
@@ -4327,7 +4327,7 @@
         </p:nvSpPr>
         <p:spPr>
           <a:xfrm>
-            <a:off x="3082805" y="1400453"/>
+            <a:off x="2813222" y="1400453"/>
             <a:ext cx="2464185" cy="302505"/>
           </a:xfrm>
           <a:prstGeom prst="rect">
@@ -4382,8 +4382,8 @@
         </p:nvSpPr>
         <p:spPr>
           <a:xfrm>
-            <a:off x="373152" y="1361114"/>
-            <a:ext cx="2484000" cy="0"/>
+            <a:off x="373152" y="1361113"/>
+            <a:ext cx="2339649" cy="2745"/>
           </a:xfrm>
           <a:prstGeom prst="line">
             <a:avLst/>
@@ -4431,7 +4431,7 @@
         <p:spPr>
           <a:xfrm>
             <a:off x="352472" y="1682962"/>
-            <a:ext cx="2508751" cy="1390680"/>
+            <a:ext cx="2360329" cy="1390680"/>
           </a:xfrm>
           <a:prstGeom prst="rect">
             <a:avLst/>
@@ -4668,7 +4668,7 @@
         <p:spPr>
           <a:xfrm>
             <a:off x="372801" y="1363861"/>
-            <a:ext cx="2484000" cy="335488"/>
+            <a:ext cx="2340000" cy="335488"/>
           </a:xfrm>
           <a:prstGeom prst="rect">
             <a:avLst/>
@@ -5085,8 +5085,8 @@
         </p:nvSpPr>
         <p:spPr>
           <a:xfrm>
-            <a:off x="5775565" y="1364754"/>
-            <a:ext cx="2484000" cy="335488"/>
+            <a:off x="5450639" y="1364754"/>
+            <a:ext cx="2808925" cy="335488"/>
           </a:xfrm>
           <a:prstGeom prst="rect">
             <a:avLst/>
@@ -5149,8 +5149,8 @@
         </p:nvSpPr>
         <p:spPr>
           <a:xfrm>
-            <a:off x="5782786" y="1400400"/>
-            <a:ext cx="2464185" cy="302505"/>
+            <a:off x="5375308" y="1400400"/>
+            <a:ext cx="2871664" cy="302505"/>
           </a:xfrm>
           <a:prstGeom prst="rect">
             <a:avLst/>
@@ -5204,7 +5204,7 @@
         </p:nvSpPr>
         <p:spPr>
           <a:xfrm>
-            <a:off x="3076394" y="1363861"/>
+            <a:off x="2812562" y="1363861"/>
             <a:ext cx="2484000" cy="0"/>
           </a:xfrm>
           <a:prstGeom prst="line">
@@ -5661,8 +5661,8 @@
         </p:nvSpPr>
         <p:spPr>
           <a:xfrm>
-            <a:off x="3059825" y="1686635"/>
-            <a:ext cx="2508751" cy="1657419"/>
+            <a:off x="2790243" y="1686635"/>
+            <a:ext cx="2405376" cy="1657419"/>
           </a:xfrm>
           <a:prstGeom prst="rect">
             <a:avLst/>
@@ -5758,7 +5758,17 @@
                   </a:extLst>
                 </a:hlinkClick>
               </a:rPr>
-              <a:t>Stats Indiana</a:t>
+              <a:t>STATS Indiana</a:t>
+            </a:r>
+            <a:r>
+              <a:rPr lang="en-SG" sz="1400" b="0" dirty="0">
+                <a:solidFill>
+                  <a:srgbClr val="618DB5"/>
+                </a:solidFill>
+                <a:latin typeface="Source Sans Pro" panose="020B0503030403020204" pitchFamily="34" charset="0"/>
+                <a:ea typeface="Source Sans Pro" panose="020B0503030403020204" pitchFamily="34" charset="0"/>
+              </a:rPr>
+              <a:t> (2021)</a:t>
             </a:r>
             <a:r>
               <a:rPr lang="en-SG" sz="1400" b="0" dirty="0">
@@ -5812,8 +5822,8 @@
         </p:nvSpPr>
         <p:spPr>
           <a:xfrm>
-            <a:off x="5703863" y="1690942"/>
-            <a:ext cx="2508751" cy="1683067"/>
+            <a:off x="5368851" y="1690942"/>
+            <a:ext cx="2879392" cy="1683067"/>
           </a:xfrm>
           <a:prstGeom prst="rect">
             <a:avLst/>
@@ -5838,7 +5848,7 @@
               <a:buChar char="•"/>
             </a:pPr>
             <a:r>
-              <a:rPr lang="en-SG" sz="1400" b="0" dirty="0">
+              <a:rPr lang="en-SG" sz="1400" b="0" u="sng" dirty="0">
                 <a:solidFill>
                   <a:srgbClr val="618DB5"/>
                 </a:solidFill>
@@ -5856,15 +5866,58 @@
               <a:t>R</a:t>
             </a:r>
             <a:r>
-              <a:rPr lang="en-SG" sz="1400" b="0" dirty="0">
-                <a:solidFill>
-                  <a:schemeClr val="tx1"/>
+              <a:rPr lang="en-SG" sz="1400" b="0" u="sng" dirty="0">
+                <a:solidFill>
+                  <a:srgbClr val="618DB5"/>
                 </a:solidFill>
                 <a:effectLst/>
                 <a:latin typeface="Source Sans Pro" panose="020B0503030403020204" pitchFamily="34" charset="0"/>
                 <a:ea typeface="Source Sans Pro" panose="020B0503030403020204" pitchFamily="34" charset="0"/>
               </a:rPr>
-              <a:t>: Programming language</a:t>
+              <a:t> Core Team</a:t>
+            </a:r>
+            <a:r>
+              <a:rPr lang="en-SG" sz="1400" b="0" dirty="0">
+                <a:solidFill>
+                  <a:srgbClr val="618DB5"/>
+                </a:solidFill>
+                <a:effectLst/>
+                <a:latin typeface="Source Sans Pro" panose="020B0503030403020204" pitchFamily="34" charset="0"/>
+                <a:ea typeface="Source Sans Pro" panose="020B0503030403020204" pitchFamily="34" charset="0"/>
+              </a:rPr>
+              <a:t> (2025)</a:t>
+            </a:r>
+            <a:r>
+              <a:rPr lang="en-SG" sz="1400" b="0" dirty="0">
+                <a:solidFill>
+                  <a:schemeClr val="tx1"/>
+                </a:solidFill>
+                <a:effectLst/>
+                <a:latin typeface="Source Sans Pro" panose="020B0503030403020204" pitchFamily="34" charset="0"/>
+                <a:ea typeface="Source Sans Pro" panose="020B0503030403020204" pitchFamily="34" charset="0"/>
+              </a:rPr>
+              <a:t>: R </a:t>
+            </a:r>
+            <a:r>
+              <a:rPr lang="en-SG" sz="1400" b="0" dirty="0">
+                <a:solidFill>
+                  <a:schemeClr val="tx1"/>
+                </a:solidFill>
+                <a:latin typeface="Source Sans Pro" panose="020B0503030403020204" pitchFamily="34" charset="0"/>
+                <a:ea typeface="Source Sans Pro" panose="020B0503030403020204" pitchFamily="34" charset="0"/>
+              </a:rPr>
+              <a:t>p</a:t>
+            </a:r>
+            <a:r>
+              <a:rPr lang="en-SG" sz="1400" b="0" dirty="0">
+                <a:solidFill>
+                  <a:schemeClr val="tx1"/>
+                </a:solidFill>
+                <a:effectLst/>
+                <a:latin typeface="Source Sans Pro" panose="020B0503030403020204" pitchFamily="34" charset="0"/>
+                <a:ea typeface="Source Sans Pro" panose="020B0503030403020204" pitchFamily="34" charset="0"/>
+              </a:rPr>
+              <a:t>rogramming language</a:t>
             </a:r>
           </a:p>
           <a:p>
@@ -5899,7 +5952,7 @@
                 <a:latin typeface="Source Sans Pro" panose="020B0503030403020204" pitchFamily="34" charset="0"/>
                 <a:ea typeface="Source Sans Pro" panose="020B0503030403020204" pitchFamily="34" charset="0"/>
               </a:rPr>
-              <a:t>: R packages for data analysis and visualization</a:t>
+              <a:t> (Wickham et al., 2019): R packages for data analysis and visualization</a:t>
             </a:r>
           </a:p>
           <a:p>

</xml_diff>

<commit_message>
QR code for references
</commit_message>
<xml_diff>
--- a/measles_poster.pptx
+++ b/measles_poster.pptx
@@ -2196,7 +2196,7 @@
           </a:ln>
           <a:extLst>
             <a:ext uri="{C572A759-6A51-4108-AA02-DFA0A04FC94B}">
-              <ma14:wrappingTextBoxFlag xmlns="" xmlns:m="http://schemas.openxmlformats.org/officeDocument/2006/math" xmlns:a14="http://schemas.microsoft.com/office/drawing/2010/main" xmlns:ma14="http://schemas.microsoft.com/office/mac/drawingml/2011/main" val="1"/>
+              <ma14:wrappingTextBoxFlag xmlns:ma14="http://schemas.microsoft.com/office/mac/drawingml/2011/main" xmlns:a14="http://schemas.microsoft.com/office/drawing/2010/main" xmlns:m="http://schemas.openxmlformats.org/officeDocument/2006/math" xmlns="" val="1"/>
             </a:ext>
           </a:extLst>
         </p:spPr>
@@ -2235,7 +2235,7 @@
           </a:ln>
           <a:extLst>
             <a:ext uri="{C572A759-6A51-4108-AA02-DFA0A04FC94B}">
-              <ma14:wrappingTextBoxFlag xmlns="" xmlns:m="http://schemas.openxmlformats.org/officeDocument/2006/math" xmlns:a14="http://schemas.microsoft.com/office/drawing/2010/main" xmlns:ma14="http://schemas.microsoft.com/office/mac/drawingml/2011/main" val="1"/>
+              <ma14:wrappingTextBoxFlag xmlns:ma14="http://schemas.microsoft.com/office/mac/drawingml/2011/main" xmlns:a14="http://schemas.microsoft.com/office/drawing/2010/main" xmlns:m="http://schemas.openxmlformats.org/officeDocument/2006/math" xmlns="" val="1"/>
             </a:ext>
           </a:extLst>
         </p:spPr>
@@ -3206,7 +3206,7 @@
           </a:ln>
           <a:extLst>
             <a:ext uri="{C572A759-6A51-4108-AA02-DFA0A04FC94B}">
-              <ma14:wrappingTextBoxFlag xmlns="" xmlns:m="http://schemas.openxmlformats.org/officeDocument/2006/math" xmlns:a14="http://schemas.microsoft.com/office/drawing/2010/main" xmlns:ma14="http://schemas.microsoft.com/office/mac/drawingml/2011/main" val="1"/>
+              <ma14:wrappingTextBoxFlag xmlns:ma14="http://schemas.microsoft.com/office/mac/drawingml/2011/main" xmlns:a14="http://schemas.microsoft.com/office/drawing/2010/main" xmlns:m="http://schemas.openxmlformats.org/officeDocument/2006/math" xmlns="" val="1"/>
             </a:ext>
           </a:extLst>
         </p:spPr>
@@ -3545,7 +3545,7 @@
           </a:ln>
           <a:extLst>
             <a:ext uri="{C572A759-6A51-4108-AA02-DFA0A04FC94B}">
-              <ma14:wrappingTextBoxFlag xmlns="" xmlns:m="http://schemas.openxmlformats.org/officeDocument/2006/math" xmlns:a14="http://schemas.microsoft.com/office/drawing/2010/main" xmlns:ma14="http://schemas.microsoft.com/office/mac/drawingml/2011/main" val="1"/>
+              <ma14:wrappingTextBoxFlag xmlns:ma14="http://schemas.microsoft.com/office/mac/drawingml/2011/main" xmlns:a14="http://schemas.microsoft.com/office/drawing/2010/main" xmlns:m="http://schemas.openxmlformats.org/officeDocument/2006/math" xmlns="" val="1"/>
             </a:ext>
           </a:extLst>
         </p:spPr>
@@ -3590,8 +3590,8 @@
         </p:nvSpPr>
         <p:spPr>
           <a:xfrm>
-            <a:off x="8602059" y="1796154"/>
-            <a:ext cx="3573958" cy="7289971"/>
+            <a:off x="8602059" y="1796155"/>
+            <a:ext cx="3573958" cy="5985908"/>
           </a:xfrm>
           <a:prstGeom prst="rect">
             <a:avLst/>
@@ -3601,7 +3601,7 @@
           </a:ln>
           <a:extLst>
             <a:ext uri="{C572A759-6A51-4108-AA02-DFA0A04FC94B}">
-              <ma14:wrappingTextBoxFlag xmlns="" xmlns:m="http://schemas.openxmlformats.org/officeDocument/2006/math" xmlns:a14="http://schemas.microsoft.com/office/drawing/2010/main" xmlns:ma14="http://schemas.microsoft.com/office/mac/drawingml/2011/main" val="1"/>
+              <ma14:wrappingTextBoxFlag xmlns:ma14="http://schemas.microsoft.com/office/mac/drawingml/2011/main" xmlns:a14="http://schemas.microsoft.com/office/drawing/2010/main" xmlns:m="http://schemas.openxmlformats.org/officeDocument/2006/math" xmlns="" val="1"/>
             </a:ext>
           </a:extLst>
         </p:spPr>
@@ -4338,7 +4338,7 @@
           </a:ln>
           <a:extLst>
             <a:ext uri="{C572A759-6A51-4108-AA02-DFA0A04FC94B}">
-              <ma14:wrappingTextBoxFlag xmlns="" xmlns:m="http://schemas.openxmlformats.org/officeDocument/2006/math" xmlns:a14="http://schemas.microsoft.com/office/drawing/2010/main" xmlns:ma14="http://schemas.microsoft.com/office/mac/drawingml/2011/main" val="1"/>
+              <ma14:wrappingTextBoxFlag xmlns:ma14="http://schemas.microsoft.com/office/mac/drawingml/2011/main" xmlns:a14="http://schemas.microsoft.com/office/drawing/2010/main" xmlns:m="http://schemas.openxmlformats.org/officeDocument/2006/math" xmlns="" val="1"/>
             </a:ext>
           </a:extLst>
         </p:spPr>
@@ -4441,7 +4441,7 @@
           </a:ln>
           <a:extLst>
             <a:ext uri="{C572A759-6A51-4108-AA02-DFA0A04FC94B}">
-              <ma14:wrappingTextBoxFlag xmlns="" xmlns:m="http://schemas.openxmlformats.org/officeDocument/2006/math" xmlns:a14="http://schemas.microsoft.com/office/drawing/2010/main" xmlns:ma14="http://schemas.microsoft.com/office/mac/drawingml/2011/main" val="1"/>
+              <ma14:wrappingTextBoxFlag xmlns:ma14="http://schemas.microsoft.com/office/mac/drawingml/2011/main" xmlns:a14="http://schemas.microsoft.com/office/drawing/2010/main" xmlns:m="http://schemas.openxmlformats.org/officeDocument/2006/math" xmlns="" val="1"/>
             </a:ext>
           </a:extLst>
         </p:spPr>
@@ -4503,7 +4503,7 @@
           </a:ln>
           <a:extLst>
             <a:ext uri="{C572A759-6A51-4108-AA02-DFA0A04FC94B}">
-              <ma14:wrappingTextBoxFlag xmlns="" xmlns:m="http://schemas.openxmlformats.org/officeDocument/2006/math" xmlns:a14="http://schemas.microsoft.com/office/drawing/2010/main" xmlns:ma14="http://schemas.microsoft.com/office/mac/drawingml/2011/main" val="1"/>
+              <ma14:wrappingTextBoxFlag xmlns:ma14="http://schemas.microsoft.com/office/mac/drawingml/2011/main" xmlns:a14="http://schemas.microsoft.com/office/drawing/2010/main" xmlns:m="http://schemas.openxmlformats.org/officeDocument/2006/math" xmlns="" val="1"/>
             </a:ext>
           </a:extLst>
         </p:spPr>
@@ -4806,7 +4806,7 @@
           </a:ln>
           <a:extLst>
             <a:ext uri="{C572A759-6A51-4108-AA02-DFA0A04FC94B}">
-              <ma14:wrappingTextBoxFlag xmlns="" xmlns:m="http://schemas.openxmlformats.org/officeDocument/2006/math" xmlns:a14="http://schemas.microsoft.com/office/drawing/2010/main" xmlns:ma14="http://schemas.microsoft.com/office/mac/drawingml/2011/main" val="1"/>
+              <ma14:wrappingTextBoxFlag xmlns:ma14="http://schemas.microsoft.com/office/mac/drawingml/2011/main" xmlns:a14="http://schemas.microsoft.com/office/drawing/2010/main" xmlns:m="http://schemas.openxmlformats.org/officeDocument/2006/math" xmlns="" val="1"/>
             </a:ext>
           </a:extLst>
         </p:spPr>
@@ -4862,7 +4862,7 @@
           </a:ln>
           <a:extLst>
             <a:ext uri="{C572A759-6A51-4108-AA02-DFA0A04FC94B}">
-              <ma14:wrappingTextBoxFlag xmlns="" xmlns:m="http://schemas.openxmlformats.org/officeDocument/2006/math" xmlns:a14="http://schemas.microsoft.com/office/drawing/2010/main" xmlns:ma14="http://schemas.microsoft.com/office/mac/drawingml/2011/main" val="1"/>
+              <ma14:wrappingTextBoxFlag xmlns:ma14="http://schemas.microsoft.com/office/mac/drawingml/2011/main" xmlns:a14="http://schemas.microsoft.com/office/drawing/2010/main" xmlns:m="http://schemas.openxmlformats.org/officeDocument/2006/math" xmlns="" val="1"/>
             </a:ext>
           </a:extLst>
         </p:spPr>
@@ -4926,7 +4926,7 @@
           </a:ln>
           <a:extLst>
             <a:ext uri="{C572A759-6A51-4108-AA02-DFA0A04FC94B}">
-              <ma14:wrappingTextBoxFlag xmlns="" xmlns:m="http://schemas.openxmlformats.org/officeDocument/2006/math" xmlns:a14="http://schemas.microsoft.com/office/drawing/2010/main" xmlns:ma14="http://schemas.microsoft.com/office/mac/drawingml/2011/main" val="1"/>
+              <ma14:wrappingTextBoxFlag xmlns:ma14="http://schemas.microsoft.com/office/mac/drawingml/2011/main" xmlns:a14="http://schemas.microsoft.com/office/drawing/2010/main" xmlns:m="http://schemas.openxmlformats.org/officeDocument/2006/math" xmlns="" val="1"/>
             </a:ext>
           </a:extLst>
         </p:spPr>
@@ -5160,7 +5160,7 @@
           </a:ln>
           <a:extLst>
             <a:ext uri="{C572A759-6A51-4108-AA02-DFA0A04FC94B}">
-              <ma14:wrappingTextBoxFlag xmlns="" xmlns:m="http://schemas.openxmlformats.org/officeDocument/2006/math" xmlns:a14="http://schemas.microsoft.com/office/drawing/2010/main" xmlns:ma14="http://schemas.microsoft.com/office/mac/drawingml/2011/main" val="1"/>
+              <ma14:wrappingTextBoxFlag xmlns:ma14="http://schemas.microsoft.com/office/mac/drawingml/2011/main" xmlns:a14="http://schemas.microsoft.com/office/drawing/2010/main" xmlns:m="http://schemas.openxmlformats.org/officeDocument/2006/math" xmlns="" val="1"/>
             </a:ext>
           </a:extLst>
         </p:spPr>
@@ -5263,7 +5263,7 @@
           </a:ln>
           <a:extLst>
             <a:ext uri="{C572A759-6A51-4108-AA02-DFA0A04FC94B}">
-              <ma14:wrappingTextBoxFlag xmlns="" xmlns:m="http://schemas.openxmlformats.org/officeDocument/2006/math" xmlns:a14="http://schemas.microsoft.com/office/drawing/2010/main" xmlns:ma14="http://schemas.microsoft.com/office/mac/drawingml/2011/main" val="1"/>
+              <ma14:wrappingTextBoxFlag xmlns:ma14="http://schemas.microsoft.com/office/mac/drawingml/2011/main" xmlns:a14="http://schemas.microsoft.com/office/drawing/2010/main" xmlns:m="http://schemas.openxmlformats.org/officeDocument/2006/math" xmlns="" val="1"/>
             </a:ext>
           </a:extLst>
         </p:spPr>
@@ -5374,7 +5374,7 @@
           </a:ln>
           <a:extLst>
             <a:ext uri="{C572A759-6A51-4108-AA02-DFA0A04FC94B}">
-              <ma14:wrappingTextBoxFlag xmlns="" xmlns:m="http://schemas.openxmlformats.org/officeDocument/2006/math" xmlns:a14="http://schemas.microsoft.com/office/drawing/2010/main" xmlns:ma14="http://schemas.microsoft.com/office/mac/drawingml/2011/main" val="1"/>
+              <ma14:wrappingTextBoxFlag xmlns:ma14="http://schemas.microsoft.com/office/mac/drawingml/2011/main" xmlns:a14="http://schemas.microsoft.com/office/drawing/2010/main" xmlns:m="http://schemas.openxmlformats.org/officeDocument/2006/math" xmlns="" val="1"/>
             </a:ext>
           </a:extLst>
         </p:spPr>
@@ -5609,7 +5609,7 @@
           </a:ln>
           <a:extLst>
             <a:ext uri="{C572A759-6A51-4108-AA02-DFA0A04FC94B}">
-              <ma14:wrappingTextBoxFlag xmlns="" xmlns:m="http://schemas.openxmlformats.org/officeDocument/2006/math" xmlns:a14="http://schemas.microsoft.com/office/drawing/2010/main" xmlns:ma14="http://schemas.microsoft.com/office/mac/drawingml/2011/main" val="1"/>
+              <ma14:wrappingTextBoxFlag xmlns:ma14="http://schemas.microsoft.com/office/mac/drawingml/2011/main" xmlns:a14="http://schemas.microsoft.com/office/drawing/2010/main" xmlns:m="http://schemas.openxmlformats.org/officeDocument/2006/math" xmlns="" val="1"/>
             </a:ext>
           </a:extLst>
         </p:spPr>
@@ -5672,7 +5672,7 @@
           </a:ln>
           <a:extLst>
             <a:ext uri="{C572A759-6A51-4108-AA02-DFA0A04FC94B}">
-              <ma14:wrappingTextBoxFlag xmlns="" xmlns:m="http://schemas.openxmlformats.org/officeDocument/2006/math" xmlns:a14="http://schemas.microsoft.com/office/drawing/2010/main" xmlns:ma14="http://schemas.microsoft.com/office/mac/drawingml/2011/main" val="1"/>
+              <ma14:wrappingTextBoxFlag xmlns:ma14="http://schemas.microsoft.com/office/mac/drawingml/2011/main" xmlns:a14="http://schemas.microsoft.com/office/drawing/2010/main" xmlns:m="http://schemas.openxmlformats.org/officeDocument/2006/math" xmlns="" val="1"/>
             </a:ext>
           </a:extLst>
         </p:spPr>
@@ -5833,7 +5833,7 @@
           </a:ln>
           <a:extLst>
             <a:ext uri="{C572A759-6A51-4108-AA02-DFA0A04FC94B}">
-              <ma14:wrappingTextBoxFlag xmlns="" xmlns:m="http://schemas.openxmlformats.org/officeDocument/2006/math" xmlns:a14="http://schemas.microsoft.com/office/drawing/2010/main" xmlns:ma14="http://schemas.microsoft.com/office/mac/drawingml/2011/main" val="1"/>
+              <ma14:wrappingTextBoxFlag xmlns:ma14="http://schemas.microsoft.com/office/mac/drawingml/2011/main" xmlns:a14="http://schemas.microsoft.com/office/drawing/2010/main" xmlns:m="http://schemas.openxmlformats.org/officeDocument/2006/math" xmlns="" val="1"/>
             </a:ext>
           </a:extLst>
         </p:spPr>
@@ -5977,7 +5977,7 @@
           </a:ln>
           <a:extLst>
             <a:ext uri="{C572A759-6A51-4108-AA02-DFA0A04FC94B}">
-              <ma14:wrappingTextBoxFlag xmlns="" xmlns:m="http://schemas.openxmlformats.org/officeDocument/2006/math" xmlns:a14="http://schemas.microsoft.com/office/drawing/2010/main" xmlns:ma14="http://schemas.microsoft.com/office/mac/drawingml/2011/main" val="1"/>
+              <ma14:wrappingTextBoxFlag xmlns:ma14="http://schemas.microsoft.com/office/mac/drawingml/2011/main" xmlns:a14="http://schemas.microsoft.com/office/drawing/2010/main" xmlns:m="http://schemas.openxmlformats.org/officeDocument/2006/math" xmlns="" val="1"/>
             </a:ext>
           </a:extLst>
         </p:spPr>
@@ -6235,6 +6235,141 @@
           </a:ln>
         </p:spPr>
       </p:pic>
+      <p:pic>
+        <p:nvPicPr>
+          <p:cNvPr id="3" name="Picture 2" descr="A qr code on a white background&#10;&#10;AI-generated content may be incorrect.">
+            <a:extLst>
+              <a:ext uri="{FF2B5EF4-FFF2-40B4-BE49-F238E27FC236}">
+                <a16:creationId xmlns:a16="http://schemas.microsoft.com/office/drawing/2014/main" id="{CBA1C558-B6DF-7181-BFD5-B56A89F42709}"/>
+              </a:ext>
+            </a:extLst>
+          </p:cNvPr>
+          <p:cNvPicPr>
+            <a:picLocks noChangeAspect="1"/>
+          </p:cNvPicPr>
+          <p:nvPr/>
+        </p:nvPicPr>
+        <p:blipFill>
+          <a:blip r:embed="rId16">
+            <a:extLst>
+              <a:ext uri="{28A0092B-C50C-407E-A947-70E740481C1C}">
+                <a14:useLocalDpi xmlns:a14="http://schemas.microsoft.com/office/drawing/2010/main" val="0"/>
+              </a:ext>
+            </a:extLst>
+          </a:blip>
+          <a:stretch>
+            <a:fillRect/>
+          </a:stretch>
+        </p:blipFill>
+        <p:spPr>
+          <a:xfrm flipH="1">
+            <a:off x="11068498" y="7773043"/>
+            <a:ext cx="1322140" cy="1322140"/>
+          </a:xfrm>
+          <a:prstGeom prst="rect">
+            <a:avLst/>
+          </a:prstGeom>
+        </p:spPr>
+      </p:pic>
+      <p:sp>
+        <p:nvSpPr>
+          <p:cNvPr id="5" name="TextBox 4">
+            <a:extLst>
+              <a:ext uri="{FF2B5EF4-FFF2-40B4-BE49-F238E27FC236}">
+                <a16:creationId xmlns:a16="http://schemas.microsoft.com/office/drawing/2014/main" id="{B7C03EB1-A23C-109C-6BEE-36EC2E82812A}"/>
+              </a:ext>
+            </a:extLst>
+          </p:cNvPr>
+          <p:cNvSpPr txBox="1"/>
+          <p:nvPr/>
+        </p:nvSpPr>
+        <p:spPr>
+          <a:xfrm>
+            <a:off x="10041443" y="7755551"/>
+            <a:ext cx="1038345" cy="351297"/>
+          </a:xfrm>
+          <a:prstGeom prst="rect">
+            <a:avLst/>
+          </a:prstGeom>
+          <a:noFill/>
+          <a:ln w="12700" cap="flat">
+            <a:noFill/>
+            <a:miter lim="400000"/>
+          </a:ln>
+          <a:effectLst/>
+          <a:sp3d/>
+        </p:spPr>
+        <p:style>
+          <a:lnRef idx="0">
+            <a:scrgbClr r="0" g="0" b="0"/>
+          </a:lnRef>
+          <a:fillRef idx="0">
+            <a:scrgbClr r="0" g="0" b="0"/>
+          </a:fillRef>
+          <a:effectRef idx="0">
+            <a:scrgbClr r="0" g="0" b="0"/>
+          </a:effectRef>
+          <a:fontRef idx="none"/>
+        </p:style>
+        <p:txBody>
+          <a:bodyPr rot="0" spcFirstLastPara="1" vertOverflow="overflow" horzOverflow="overflow" vert="horz" wrap="none" lIns="54570" tIns="54570" rIns="54570" bIns="54570" numCol="1" spcCol="38100" rtlCol="0" anchor="ctr">
+            <a:spAutoFit/>
+          </a:bodyPr>
+          <a:lstStyle/>
+          <a:p>
+            <a:pPr marL="0" marR="0" indent="0" algn="l" defTabSz="584200" rtl="0" fontAlgn="auto" latinLnBrk="0" hangingPunct="0">
+              <a:lnSpc>
+                <a:spcPct val="100000"/>
+              </a:lnSpc>
+              <a:spcBef>
+                <a:spcPts val="200"/>
+              </a:spcBef>
+              <a:spcAft>
+                <a:spcPts val="0"/>
+              </a:spcAft>
+              <a:buClrTx/>
+              <a:buSzTx/>
+              <a:buFontTx/>
+              <a:buNone/>
+              <a:tabLst/>
+            </a:pPr>
+            <a:r>
+              <a:rPr kumimoji="0" lang="en-US" sz="1400" b="1" i="0" u="none" strike="noStrike" cap="none" spc="0" normalizeH="0" baseline="0" dirty="0">
+                <a:ln>
+                  <a:noFill/>
+                </a:ln>
+                <a:solidFill>
+                  <a:srgbClr val="4C4C4C"/>
+                </a:solidFill>
+                <a:effectLst/>
+                <a:uFillTx/>
+                <a:latin typeface="Source Sans Pro"/>
+                <a:ea typeface="Source Sans Pro"/>
+                <a:cs typeface="Source Sans Pro"/>
+                <a:sym typeface="Source Sans Pro"/>
+              </a:rPr>
+              <a:t>References</a:t>
+            </a:r>
+            <a:r>
+              <a:rPr kumimoji="0" lang="en-US" sz="1200" b="1" i="0" u="none" strike="noStrike" cap="none" spc="0" normalizeH="0" baseline="0" dirty="0">
+                <a:ln>
+                  <a:noFill/>
+                </a:ln>
+                <a:solidFill>
+                  <a:srgbClr val="4C4C4C"/>
+                </a:solidFill>
+                <a:effectLst/>
+                <a:uFillTx/>
+                <a:latin typeface="Source Sans Pro"/>
+                <a:ea typeface="Source Sans Pro"/>
+                <a:cs typeface="Source Sans Pro"/>
+                <a:sym typeface="Source Sans Pro"/>
+              </a:rPr>
+              <a:t>:</a:t>
+            </a:r>
+          </a:p>
+        </p:txBody>
+      </p:sp>
     </p:spTree>
   </p:cSld>
   <p:clrMapOvr>

</xml_diff>